<commit_message>
Complete Lab 2 2) - diagram part
</commit_message>
<xml_diff>
--- a/Labb2.pptx
+++ b/Labb2.pptx
@@ -2717,7 +2717,7 @@
         </p:nvSpPr>
         <p:spPr>
           <a:xfrm>
-            <a:off x="3455100" y="1078121"/>
+            <a:off x="3371900" y="2575080"/>
             <a:ext cx="1295640" cy="609480"/>
           </a:xfrm>
           <a:prstGeom prst="diamond">
@@ -3145,7 +3145,7 @@
         </p:nvSpPr>
         <p:spPr>
           <a:xfrm>
-            <a:off x="2403949" y="1654343"/>
+            <a:off x="2661840" y="1508291"/>
             <a:ext cx="1295280" cy="609480"/>
           </a:xfrm>
           <a:prstGeom prst="diamond">
@@ -3636,7 +3636,7 @@
         </p:nvSpPr>
         <p:spPr>
           <a:xfrm>
-            <a:off x="1368000" y="2503080"/>
+            <a:off x="16343" y="2314260"/>
             <a:ext cx="838080" cy="304920"/>
           </a:xfrm>
           <a:prstGeom prst="ellipse">
@@ -4296,7 +4296,7 @@
         </p:nvSpPr>
         <p:spPr>
           <a:xfrm>
-            <a:off x="216000" y="3816000"/>
+            <a:off x="435383" y="4449600"/>
             <a:ext cx="838080" cy="304920"/>
           </a:xfrm>
           <a:prstGeom prst="ellipse">
@@ -4559,16 +4559,17 @@
         <p:nvCxnSpPr>
           <p:cNvPr id="90" name="Line 50"/>
           <p:cNvCxnSpPr>
-            <a:endCxn id="49" idx="0"/>
+            <a:stCxn id="134" idx="0"/>
+            <a:endCxn id="49" idx="1"/>
           </p:cNvCxnSpPr>
           <p:nvPr/>
         </p:nvCxnSpPr>
         <p:spPr>
-          <a:xfrm flipH="1">
-            <a:off x="1259280" y="3168000"/>
-            <a:ext cx="770040" cy="16920"/>
-          </a:xfrm>
-          <a:prstGeom prst="bentConnector3">
+          <a:xfrm rot="5400000" flipH="1" flipV="1">
+            <a:off x="359872" y="3482872"/>
+            <a:ext cx="343800" cy="143896"/>
+          </a:xfrm>
+          <a:prstGeom prst="bentConnector2">
             <a:avLst/>
           </a:prstGeom>
           <a:ln w="9360">
@@ -4589,12 +4590,14 @@
           <p:nvPr/>
         </p:nvCxnSpPr>
         <p:spPr>
-          <a:xfrm flipH="1">
-            <a:off x="1259280" y="2808000"/>
-            <a:ext cx="528120" cy="376920"/>
+          <a:xfrm rot="16200000" flipH="1">
+            <a:off x="564731" y="2489831"/>
+            <a:ext cx="565380" cy="824077"/>
           </a:xfrm>
           <a:prstGeom prst="bentConnector3">
-            <a:avLst/>
+            <a:avLst>
+              <a:gd name="adj1" fmla="val 20594"/>
+            </a:avLst>
           </a:prstGeom>
           <a:ln w="9360">
             <a:solidFill>
@@ -4708,17 +4711,17 @@
         <p:nvCxnSpPr>
           <p:cNvPr id="96" name="Line 56"/>
           <p:cNvCxnSpPr>
-            <a:stCxn id="83" idx="4"/>
+            <a:stCxn id="83" idx="0"/>
             <a:endCxn id="53" idx="1"/>
           </p:cNvCxnSpPr>
           <p:nvPr/>
         </p:nvCxnSpPr>
         <p:spPr>
-          <a:xfrm>
-            <a:off x="635040" y="4120920"/>
-            <a:ext cx="230040" cy="72360"/>
-          </a:xfrm>
-          <a:prstGeom prst="bentConnector3">
+          <a:xfrm rot="5400000" flipH="1" flipV="1">
+            <a:off x="731141" y="4316022"/>
+            <a:ext cx="256860" cy="10297"/>
+          </a:xfrm>
+          <a:prstGeom prst="bentConnector2">
             <a:avLst/>
           </a:prstGeom>
           <a:ln w="9360">
@@ -5378,14 +5381,14 @@
           <p:cNvPr id="123" name="Line 83"/>
           <p:cNvCxnSpPr>
             <a:stCxn id="48" idx="1"/>
-            <a:endCxn id="54" idx="2"/>
+            <a:endCxn id="54" idx="0"/>
           </p:cNvCxnSpPr>
           <p:nvPr/>
         </p:nvCxnSpPr>
         <p:spPr>
-          <a:xfrm rot="10800000">
-            <a:off x="4102920" y="1687602"/>
-            <a:ext cx="577080" cy="166939"/>
+          <a:xfrm rot="10800000" flipV="1">
+            <a:off x="4019720" y="1854540"/>
+            <a:ext cx="660280" cy="720540"/>
           </a:xfrm>
           <a:prstGeom prst="bentConnector2">
             <a:avLst/>
@@ -5403,14 +5406,14 @@
           <p:cNvPr id="124" name="Line 84"/>
           <p:cNvCxnSpPr>
             <a:stCxn id="54" idx="1"/>
-            <a:endCxn id="46" idx="3"/>
+            <a:endCxn id="167" idx="3"/>
           </p:cNvCxnSpPr>
           <p:nvPr/>
         </p:nvCxnSpPr>
         <p:spPr>
           <a:xfrm rot="10800000">
-            <a:off x="2880000" y="1241461"/>
-            <a:ext cx="575100" cy="141401"/>
+            <a:off x="2873526" y="2367138"/>
+            <a:ext cx="498375" cy="512682"/>
           </a:xfrm>
           <a:prstGeom prst="bentConnector3">
             <a:avLst/>
@@ -5427,15 +5430,15 @@
         <p:nvCxnSpPr>
           <p:cNvPr id="125" name="Line 85"/>
           <p:cNvCxnSpPr>
-            <a:stCxn id="46" idx="2"/>
-            <a:endCxn id="62" idx="1"/>
+            <a:stCxn id="167" idx="3"/>
+            <a:endCxn id="62" idx="2"/>
           </p:cNvCxnSpPr>
           <p:nvPr/>
         </p:nvCxnSpPr>
         <p:spPr>
-          <a:xfrm rot="16200000" flipH="1">
-            <a:off x="2054563" y="1609696"/>
-            <a:ext cx="519083" cy="179689"/>
+          <a:xfrm flipV="1">
+            <a:off x="2873525" y="2117771"/>
+            <a:ext cx="435955" cy="249367"/>
           </a:xfrm>
           <a:prstGeom prst="bentConnector2">
             <a:avLst/>
@@ -5459,8 +5462,8 @@
         </p:nvCxnSpPr>
         <p:spPr>
           <a:xfrm rot="16200000" flipV="1">
-            <a:off x="2759354" y="1362107"/>
-            <a:ext cx="412883" cy="171589"/>
+            <a:off x="2961325" y="1160136"/>
+            <a:ext cx="266831" cy="429480"/>
           </a:xfrm>
           <a:prstGeom prst="bentConnector2">
             <a:avLst/>
@@ -5776,7 +5779,7 @@
         </p:nvSpPr>
         <p:spPr>
           <a:xfrm>
-            <a:off x="1609920" y="2863440"/>
+            <a:off x="40784" y="3726720"/>
             <a:ext cx="838080" cy="304560"/>
           </a:xfrm>
           <a:prstGeom prst="ellipse">
@@ -5814,12 +5817,12 @@
               </a:lnSpc>
             </a:pPr>
             <a:r>
-              <a:rPr lang="en-GB" sz="1200">
+              <a:rPr lang="en-GB" sz="1200" dirty="0" err="1">
                 <a:latin typeface="Arial"/>
               </a:rPr>
               <a:t>sdate</a:t>
             </a:r>
-            <a:endParaRPr/>
+            <a:endParaRPr dirty="0"/>
           </a:p>
         </p:txBody>
       </p:sp>
@@ -6695,7 +6698,7 @@
         </p:nvSpPr>
         <p:spPr>
           <a:xfrm>
-            <a:off x="1612274" y="1559048"/>
+            <a:off x="3275716" y="2088891"/>
             <a:ext cx="269626" cy="276999"/>
           </a:xfrm>
           <a:prstGeom prst="rect">
@@ -6725,7 +6728,7 @@
         </p:nvSpPr>
         <p:spPr>
           <a:xfrm>
-            <a:off x="3144383" y="1583149"/>
+            <a:off x="3299094" y="1271476"/>
             <a:ext cx="295274" cy="276999"/>
           </a:xfrm>
           <a:prstGeom prst="rect">
@@ -6899,14 +6902,14 @@
       </p:sp>
       <p:sp>
         <p:nvSpPr>
-          <p:cNvPr id="165" name="TextBox 164"/>
+          <p:cNvPr id="166" name="TextBox 165"/>
           <p:cNvSpPr txBox="1"/>
           <p:nvPr/>
         </p:nvSpPr>
         <p:spPr>
           <a:xfrm>
-            <a:off x="4086589" y="1593341"/>
-            <a:ext cx="295274" cy="276999"/>
+            <a:off x="3186491" y="2604888"/>
+            <a:ext cx="269626" cy="276999"/>
           </a:xfrm>
           <a:prstGeom prst="rect">
             <a:avLst/>
@@ -6921,7 +6924,7 @@
           <a:p>
             <a:r>
               <a:rPr lang="en-US" sz="1200" dirty="0" smtClean="0"/>
-              <a:t>N</a:t>
+              <a:t>1</a:t>
             </a:r>
             <a:endParaRPr lang="en-US" sz="1200" dirty="0"/>
           </a:p>
@@ -6929,14 +6932,96 @@
       </p:sp>
       <p:sp>
         <p:nvSpPr>
-          <p:cNvPr id="166" name="TextBox 165"/>
+          <p:cNvPr id="167" name="CustomShape 6"/>
+          <p:cNvSpPr/>
+          <p:nvPr/>
+        </p:nvSpPr>
+        <p:spPr>
+          <a:xfrm>
+            <a:off x="1562045" y="2164656"/>
+            <a:ext cx="1311480" cy="404963"/>
+          </a:xfrm>
+          <a:prstGeom prst="rect">
+            <a:avLst/>
+          </a:prstGeom>
+          <a:solidFill>
+            <a:srgbClr val="EAEAEA"/>
+          </a:solidFill>
+          <a:ln w="3240">
+            <a:solidFill>
+              <a:srgbClr val="000000"/>
+            </a:solidFill>
+            <a:miter/>
+          </a:ln>
+        </p:spPr>
+        <p:style>
+          <a:lnRef idx="0">
+            <a:scrgbClr r="0" g="0" b="0"/>
+          </a:lnRef>
+          <a:fillRef idx="0">
+            <a:scrgbClr r="0" g="0" b="0"/>
+          </a:fillRef>
+          <a:effectRef idx="0">
+            <a:scrgbClr r="0" g="0" b="0"/>
+          </a:effectRef>
+          <a:fontRef idx="minor"/>
+        </p:style>
+        <p:txBody>
+          <a:bodyPr wrap="none" lIns="90000" tIns="46800" rIns="90000" bIns="46800" anchor="ctr"/>
+          <a:lstStyle/>
+          <a:p>
+            <a:pPr algn="ctr">
+              <a:lnSpc>
+                <a:spcPct val="100000"/>
+              </a:lnSpc>
+            </a:pPr>
+            <a:r>
+              <a:rPr lang="en-US" sz="1400" b="1" dirty="0" smtClean="0">
+                <a:latin typeface="Arial"/>
+              </a:rPr>
+              <a:t>Manager</a:t>
+            </a:r>
+            <a:endParaRPr dirty="0"/>
+          </a:p>
+        </p:txBody>
+      </p:sp>
+      <p:cxnSp>
+        <p:nvCxnSpPr>
+          <p:cNvPr id="168" name="Line 85"/>
+          <p:cNvCxnSpPr>
+            <a:stCxn id="46" idx="2"/>
+            <a:endCxn id="167" idx="0"/>
+          </p:cNvCxnSpPr>
+          <p:nvPr/>
+        </p:nvCxnSpPr>
+        <p:spPr>
+          <a:xfrm rot="5400000">
+            <a:off x="1858695" y="1799091"/>
+            <a:ext cx="724656" cy="6475"/>
+          </a:xfrm>
+          <a:prstGeom prst="bentConnector3">
+            <a:avLst>
+              <a:gd name="adj1" fmla="val 50000"/>
+            </a:avLst>
+          </a:prstGeom>
+          <a:ln w="9360">
+            <a:solidFill>
+              <a:srgbClr val="000000"/>
+            </a:solidFill>
+            <a:round/>
+          </a:ln>
+        </p:spPr>
+      </p:cxnSp>
+      <p:sp>
+        <p:nvSpPr>
+          <p:cNvPr id="169" name="TextBox 168"/>
           <p:cNvSpPr txBox="1"/>
           <p:nvPr/>
         </p:nvSpPr>
         <p:spPr>
           <a:xfrm>
-            <a:off x="3292020" y="1098441"/>
-            <a:ext cx="269626" cy="276999"/>
+            <a:off x="3985920" y="2338336"/>
+            <a:ext cx="295274" cy="276999"/>
           </a:xfrm>
           <a:prstGeom prst="rect">
             <a:avLst/>
@@ -6951,9 +7036,39 @@
           <a:p>
             <a:r>
               <a:rPr lang="en-US" sz="1200" dirty="0" smtClean="0"/>
-              <a:t>1</a:t>
+              <a:t>N</a:t>
             </a:r>
             <a:endParaRPr lang="en-US" sz="1200" dirty="0"/>
+          </a:p>
+        </p:txBody>
+      </p:sp>
+      <p:sp>
+        <p:nvSpPr>
+          <p:cNvPr id="170" name="TextBox 169"/>
+          <p:cNvSpPr txBox="1"/>
+          <p:nvPr/>
+        </p:nvSpPr>
+        <p:spPr>
+          <a:xfrm>
+            <a:off x="2069418" y="1643754"/>
+            <a:ext cx="332142" cy="338554"/>
+          </a:xfrm>
+          <a:prstGeom prst="rect">
+            <a:avLst/>
+          </a:prstGeom>
+          <a:noFill/>
+        </p:spPr>
+        <p:txBody>
+          <a:bodyPr wrap="none" rtlCol="0">
+            <a:spAutoFit/>
+          </a:bodyPr>
+          <a:lstStyle/>
+          <a:p>
+            <a:r>
+              <a:rPr lang="en-US" sz="1600" dirty="0" smtClean="0"/>
+              <a:t>U</a:t>
+            </a:r>
+            <a:endParaRPr lang="en-US" sz="1600" dirty="0"/>
           </a:p>
         </p:txBody>
       </p:sp>

</xml_diff>